<commit_message>
Working on final RandomForest
</commit_message>
<xml_diff>
--- a/Presentations/Week4 - Onboarding.pptx
+++ b/Presentations/Week4 - Onboarding.pptx
@@ -3609,7 +3609,7 @@
         <p:spPr>
           <a:xfrm>
             <a:off x="0" y="39835"/>
-            <a:ext cx="8894618" cy="3422475"/>
+            <a:ext cx="11887200" cy="3422475"/>
           </a:xfrm>
           <a:prstGeom prst="rect">
             <a:avLst/>
@@ -3638,7 +3638,27 @@
                 <a:latin typeface="Helvetica"/>
                 <a:cs typeface="Helvetica"/>
               </a:rPr>
-              <a:t>Onboarding Analysis of Glass SAMPLES</a:t>
+              <a:t>Week 1</a:t>
+            </a:r>
+          </a:p>
+          <a:p>
+            <a:pPr>
+              <a:lnSpc>
+                <a:spcPct val="90000"/>
+              </a:lnSpc>
+            </a:pPr>
+            <a:r>
+              <a:rPr lang="en-US" sz="8000" b="1" cap="small" spc="-300" dirty="0">
+                <a:ln w="3175">
+                  <a:noFill/>
+                </a:ln>
+                <a:solidFill>
+                  <a:schemeClr val="bg1"/>
+                </a:solidFill>
+                <a:latin typeface="Helvetica"/>
+                <a:cs typeface="Helvetica"/>
+              </a:rPr>
+              <a:t>Onboarding – Feature Engineering </a:t>
             </a:r>
           </a:p>
         </p:txBody>
@@ -8689,6 +8709,45 @@
           </a:extLst>
         </p:spPr>
       </p:pic>
+      <p:sp>
+        <p:nvSpPr>
+          <p:cNvPr id="3" name="TextBox 2">
+            <a:extLst>
+              <a:ext uri="{FF2B5EF4-FFF2-40B4-BE49-F238E27FC236}">
+                <a16:creationId xmlns:a16="http://schemas.microsoft.com/office/drawing/2014/main" id="{B481FEDF-5ABB-A048-987F-8CD11032A087}"/>
+              </a:ext>
+            </a:extLst>
+          </p:cNvPr>
+          <p:cNvSpPr txBox="1"/>
+          <p:nvPr/>
+        </p:nvSpPr>
+        <p:spPr>
+          <a:xfrm>
+            <a:off x="2085975" y="5815013"/>
+            <a:ext cx="6030625" cy="369332"/>
+          </a:xfrm>
+          <a:prstGeom prst="rect">
+            <a:avLst/>
+          </a:prstGeom>
+          <a:noFill/>
+        </p:spPr>
+        <p:txBody>
+          <a:bodyPr wrap="none" rtlCol="0">
+            <a:spAutoFit/>
+          </a:bodyPr>
+          <a:lstStyle/>
+          <a:p>
+            <a:r>
+              <a:rPr lang="en-US" dirty="0">
+                <a:solidFill>
+                  <a:schemeClr val="bg1"/>
+                </a:solidFill>
+              </a:rPr>
+              <a:t>Look at CS 111 Reading notes for tips on what to improve here</a:t>
+            </a:r>
+          </a:p>
+        </p:txBody>
+      </p:sp>
     </p:spTree>
     <p:extLst>
       <p:ext uri="{BB962C8B-B14F-4D97-AF65-F5344CB8AC3E}">

</xml_diff>